<commit_message>
sync with irina, updates to principles
</commit_message>
<xml_diff>
--- a/Figures.pptx
+++ b/Figures.pptx
@@ -3068,17 +3068,14 @@
         </p:nvSpPr>
         <p:spPr>
           <a:xfrm>
-            <a:off x="1295400" y="838200"/>
-            <a:ext cx="3733800" cy="914400"/>
+            <a:off x="1295400" y="1066800"/>
+            <a:ext cx="3733800" cy="685800"/>
           </a:xfrm>
           <a:prstGeom prst="rect">
             <a:avLst/>
           </a:prstGeom>
           <a:solidFill>
-            <a:schemeClr val="tx2">
-              <a:lumMod val="60000"/>
-              <a:lumOff val="40000"/>
-            </a:schemeClr>
+            <a:srgbClr val="FFFFFF"/>
           </a:solidFill>
         </p:spPr>
         <p:style>
@@ -3124,17 +3121,14 @@
         </p:nvSpPr>
         <p:spPr>
           <a:xfrm>
-            <a:off x="1295400" y="1828800"/>
-            <a:ext cx="3733800" cy="2286000"/>
+            <a:off x="1295400" y="2129134"/>
+            <a:ext cx="3048000" cy="2061865"/>
           </a:xfrm>
           <a:prstGeom prst="rect">
             <a:avLst/>
           </a:prstGeom>
           <a:solidFill>
-            <a:schemeClr val="tx2">
-              <a:lumMod val="60000"/>
-              <a:lumOff val="40000"/>
-            </a:schemeClr>
+            <a:srgbClr val="FFFFFF"/>
           </a:solidFill>
         </p:spPr>
         <p:style>
@@ -3172,7 +3166,7 @@
         </p:nvSpPr>
         <p:spPr>
           <a:xfrm>
-            <a:off x="2209800" y="1828800"/>
+            <a:off x="1524000" y="2129135"/>
             <a:ext cx="2133600" cy="461665"/>
           </a:xfrm>
           <a:prstGeom prst="rect">
@@ -3210,7 +3204,7 @@
         </p:nvSpPr>
         <p:spPr>
           <a:xfrm>
-            <a:off x="1371600" y="2362200"/>
+            <a:off x="1371600" y="2590800"/>
             <a:ext cx="2362200" cy="304800"/>
           </a:xfrm>
           <a:prstGeom prst="roundRect">
@@ -3244,14 +3238,13 @@
           <a:bodyPr rtlCol="0" anchor="ctr"/>
           <a:lstStyle/>
           <a:p>
-            <a:pPr algn="ctr"/>
             <a:r>
               <a:rPr lang="en-US" sz="1400" i="1" cap="all" dirty="0" smtClean="0">
                 <a:solidFill>
                   <a:schemeClr val="tx1"/>
                 </a:solidFill>
               </a:rPr>
-              <a:t>Business Architecture</a:t>
+              <a:t>Architecture As-IS</a:t>
             </a:r>
             <a:endParaRPr lang="en-US" sz="1400" i="1" cap="all" dirty="0">
               <a:solidFill>
@@ -3269,7 +3262,7 @@
         </p:nvSpPr>
         <p:spPr>
           <a:xfrm>
-            <a:off x="1371600" y="2743200"/>
+            <a:off x="1371600" y="2971800"/>
             <a:ext cx="2362200" cy="304800"/>
           </a:xfrm>
           <a:prstGeom prst="roundRect">
@@ -3303,14 +3296,13 @@
           <a:bodyPr rtlCol="0" anchor="ctr"/>
           <a:lstStyle/>
           <a:p>
-            <a:pPr algn="ctr"/>
             <a:r>
               <a:rPr lang="en-US" sz="1400" i="1" cap="all" dirty="0" smtClean="0">
                 <a:solidFill>
                   <a:schemeClr val="tx1"/>
                 </a:solidFill>
               </a:rPr>
-              <a:t>Data Architecture</a:t>
+              <a:t>Architecture TO-BE</a:t>
             </a:r>
             <a:endParaRPr lang="en-US" sz="1400" i="1" cap="all" dirty="0">
               <a:solidFill>
@@ -3328,8 +3320,8 @@
         </p:nvSpPr>
         <p:spPr>
           <a:xfrm>
-            <a:off x="1371600" y="3124200"/>
-            <a:ext cx="2362200" cy="304800"/>
+            <a:off x="1371600" y="3276600"/>
+            <a:ext cx="2590800" cy="381000"/>
           </a:xfrm>
           <a:prstGeom prst="roundRect">
             <a:avLst/>
@@ -3362,14 +3354,13 @@
           <a:bodyPr rtlCol="0" anchor="ctr"/>
           <a:lstStyle/>
           <a:p>
-            <a:pPr algn="ctr"/>
             <a:r>
               <a:rPr lang="en-US" sz="1400" i="1" cap="all" dirty="0" smtClean="0">
                 <a:solidFill>
                   <a:schemeClr val="tx1"/>
                 </a:solidFill>
               </a:rPr>
-              <a:t>Application Architecture</a:t>
+              <a:t>Transformation Roadmap</a:t>
             </a:r>
             <a:endParaRPr lang="en-US" sz="1400" i="1" cap="all" dirty="0">
               <a:solidFill>
@@ -3387,8 +3378,8 @@
         </p:nvSpPr>
         <p:spPr>
           <a:xfrm>
-            <a:off x="1371600" y="3505200"/>
-            <a:ext cx="2362200" cy="533400"/>
+            <a:off x="1371600" y="3657600"/>
+            <a:ext cx="2895600" cy="533400"/>
           </a:xfrm>
           <a:prstGeom prst="roundRect">
             <a:avLst/>
@@ -3421,14 +3412,21 @@
           <a:bodyPr rtlCol="0" anchor="ctr"/>
           <a:lstStyle/>
           <a:p>
-            <a:pPr algn="ctr"/>
             <a:r>
               <a:rPr lang="en-US" sz="1400" i="1" cap="all" dirty="0" smtClean="0">
                 <a:solidFill>
                   <a:schemeClr val="tx1"/>
                 </a:solidFill>
               </a:rPr>
-              <a:t>Infrastructure Architecture</a:t>
+              <a:t>Guiding principles for </a:t>
+            </a:r>
+            <a:r>
+              <a:rPr lang="en-US" sz="1400" i="1" cap="all" dirty="0" smtClean="0">
+                <a:solidFill>
+                  <a:schemeClr val="tx1"/>
+                </a:solidFill>
+              </a:rPr>
+              <a:t>transformation (EA Principles)</a:t>
             </a:r>
             <a:endParaRPr lang="en-US" sz="1400" i="1" cap="all" dirty="0">
               <a:solidFill>
@@ -3446,17 +3444,14 @@
         </p:nvSpPr>
         <p:spPr>
           <a:xfrm>
-            <a:off x="1295400" y="4191000"/>
-            <a:ext cx="3733800" cy="914400"/>
+            <a:off x="1295400" y="4647142"/>
+            <a:ext cx="3733800" cy="744802"/>
           </a:xfrm>
           <a:prstGeom prst="rect">
             <a:avLst/>
           </a:prstGeom>
           <a:solidFill>
-            <a:schemeClr val="tx2">
-              <a:lumMod val="60000"/>
-              <a:lumOff val="40000"/>
-            </a:schemeClr>
+            <a:srgbClr val="FFFFFF"/>
           </a:solidFill>
         </p:spPr>
         <p:style>
@@ -3510,8 +3505,8 @@
         </p:blipFill>
         <p:spPr>
           <a:xfrm>
-            <a:off x="3903684" y="4191000"/>
-            <a:ext cx="1125515" cy="915458"/>
+            <a:off x="4056084" y="4648200"/>
+            <a:ext cx="820716" cy="667544"/>
           </a:xfrm>
           <a:prstGeom prst="rect">
             <a:avLst/>
@@ -3534,8 +3529,8 @@
         </p:blipFill>
         <p:spPr>
           <a:xfrm>
-            <a:off x="3962400" y="2511425"/>
-            <a:ext cx="1066800" cy="1069975"/>
+            <a:off x="3580496" y="2206625"/>
+            <a:ext cx="762904" cy="765175"/>
           </a:xfrm>
           <a:prstGeom prst="rect">
             <a:avLst/>
@@ -3560,14 +3555,230 @@
         </p:blipFill>
         <p:spPr>
           <a:xfrm>
-            <a:off x="3962400" y="838200"/>
-            <a:ext cx="1071563" cy="914400"/>
+            <a:off x="4230291" y="1066800"/>
+            <a:ext cx="803672" cy="685800"/>
           </a:xfrm>
           <a:prstGeom prst="rect">
             <a:avLst/>
           </a:prstGeom>
         </p:spPr>
       </p:pic>
+      <p:sp>
+        <p:nvSpPr>
+          <p:cNvPr id="13" name="Down Arrow 12"/>
+          <p:cNvSpPr/>
+          <p:nvPr/>
+        </p:nvSpPr>
+        <p:spPr>
+          <a:xfrm>
+            <a:off x="2684485" y="1752600"/>
+            <a:ext cx="326607" cy="457200"/>
+          </a:xfrm>
+          <a:prstGeom prst="downArrow">
+            <a:avLst/>
+          </a:prstGeom>
+        </p:spPr>
+        <p:style>
+          <a:lnRef idx="1">
+            <a:schemeClr val="accent1"/>
+          </a:lnRef>
+          <a:fillRef idx="3">
+            <a:schemeClr val="accent1"/>
+          </a:fillRef>
+          <a:effectRef idx="2">
+            <a:schemeClr val="accent1"/>
+          </a:effectRef>
+          <a:fontRef idx="minor">
+            <a:schemeClr val="lt1"/>
+          </a:fontRef>
+        </p:style>
+        <p:txBody>
+          <a:bodyPr rtlCol="0" anchor="ctr"/>
+          <a:lstStyle/>
+          <a:p>
+            <a:pPr algn="ctr"/>
+            <a:endParaRPr lang="en-US"/>
+          </a:p>
+        </p:txBody>
+      </p:sp>
+      <p:sp>
+        <p:nvSpPr>
+          <p:cNvPr id="14" name="TextBox 13"/>
+          <p:cNvSpPr txBox="1"/>
+          <p:nvPr/>
+        </p:nvSpPr>
+        <p:spPr>
+          <a:xfrm>
+            <a:off x="1981201" y="1676400"/>
+            <a:ext cx="1828799" cy="369332"/>
+          </a:xfrm>
+          <a:prstGeom prst="rect">
+            <a:avLst/>
+          </a:prstGeom>
+          <a:noFill/>
+        </p:spPr>
+        <p:txBody>
+          <a:bodyPr wrap="square" rtlCol="0">
+            <a:spAutoFit/>
+          </a:bodyPr>
+          <a:lstStyle/>
+          <a:p>
+            <a:r>
+              <a:rPr lang="en-US" i="1" dirty="0" smtClean="0"/>
+              <a:t>i</a:t>
+            </a:r>
+            <a:r>
+              <a:rPr lang="en-US" i="1" dirty="0" smtClean="0"/>
+              <a:t>s constructing</a:t>
+            </a:r>
+            <a:endParaRPr lang="en-US" i="1" dirty="0"/>
+          </a:p>
+        </p:txBody>
+      </p:sp>
+      <p:sp>
+        <p:nvSpPr>
+          <p:cNvPr id="15" name="Down Arrow 14"/>
+          <p:cNvSpPr/>
+          <p:nvPr/>
+        </p:nvSpPr>
+        <p:spPr>
+          <a:xfrm>
+            <a:off x="4572000" y="1752600"/>
+            <a:ext cx="326607" cy="2970742"/>
+          </a:xfrm>
+          <a:prstGeom prst="downArrow">
+            <a:avLst/>
+          </a:prstGeom>
+        </p:spPr>
+        <p:style>
+          <a:lnRef idx="1">
+            <a:schemeClr val="accent1"/>
+          </a:lnRef>
+          <a:fillRef idx="3">
+            <a:schemeClr val="accent1"/>
+          </a:fillRef>
+          <a:effectRef idx="2">
+            <a:schemeClr val="accent1"/>
+          </a:effectRef>
+          <a:fontRef idx="minor">
+            <a:schemeClr val="lt1"/>
+          </a:fontRef>
+        </p:style>
+        <p:txBody>
+          <a:bodyPr rtlCol="0" anchor="ctr"/>
+          <a:lstStyle/>
+          <a:p>
+            <a:pPr algn="ctr"/>
+            <a:endParaRPr lang="en-US"/>
+          </a:p>
+        </p:txBody>
+      </p:sp>
+      <p:sp>
+        <p:nvSpPr>
+          <p:cNvPr id="16" name="TextBox 15"/>
+          <p:cNvSpPr txBox="1"/>
+          <p:nvPr/>
+        </p:nvSpPr>
+        <p:spPr>
+          <a:xfrm>
+            <a:off x="3903685" y="4114800"/>
+            <a:ext cx="1354116" cy="369332"/>
+          </a:xfrm>
+          <a:prstGeom prst="rect">
+            <a:avLst/>
+          </a:prstGeom>
+          <a:noFill/>
+        </p:spPr>
+        <p:txBody>
+          <a:bodyPr wrap="square" rtlCol="0">
+            <a:spAutoFit/>
+          </a:bodyPr>
+          <a:lstStyle/>
+          <a:p>
+            <a:r>
+              <a:rPr lang="en-US" i="1" dirty="0" smtClean="0"/>
+              <a:t>i</a:t>
+            </a:r>
+            <a:r>
+              <a:rPr lang="en-US" i="1" dirty="0" smtClean="0"/>
+              <a:t>s setting up</a:t>
+            </a:r>
+            <a:endParaRPr lang="en-US" i="1" dirty="0"/>
+          </a:p>
+        </p:txBody>
+      </p:sp>
+      <p:sp>
+        <p:nvSpPr>
+          <p:cNvPr id="18" name="Down Arrow 17"/>
+          <p:cNvSpPr/>
+          <p:nvPr/>
+        </p:nvSpPr>
+        <p:spPr>
+          <a:xfrm rot="10800000">
+            <a:off x="2779637" y="4191000"/>
+            <a:ext cx="326607" cy="457200"/>
+          </a:xfrm>
+          <a:prstGeom prst="downArrow">
+            <a:avLst/>
+          </a:prstGeom>
+        </p:spPr>
+        <p:style>
+          <a:lnRef idx="1">
+            <a:schemeClr val="accent1"/>
+          </a:lnRef>
+          <a:fillRef idx="3">
+            <a:schemeClr val="accent1"/>
+          </a:fillRef>
+          <a:effectRef idx="2">
+            <a:schemeClr val="accent1"/>
+          </a:effectRef>
+          <a:fontRef idx="minor">
+            <a:schemeClr val="lt1"/>
+          </a:fontRef>
+        </p:style>
+        <p:txBody>
+          <a:bodyPr rtlCol="0" anchor="ctr"/>
+          <a:lstStyle/>
+          <a:p>
+            <a:pPr algn="ctr"/>
+            <a:endParaRPr lang="en-US"/>
+          </a:p>
+        </p:txBody>
+      </p:sp>
+      <p:sp>
+        <p:nvSpPr>
+          <p:cNvPr id="19" name="TextBox 18"/>
+          <p:cNvSpPr txBox="1"/>
+          <p:nvPr/>
+        </p:nvSpPr>
+        <p:spPr>
+          <a:xfrm>
+            <a:off x="2133600" y="4278868"/>
+            <a:ext cx="972644" cy="369332"/>
+          </a:xfrm>
+          <a:prstGeom prst="rect">
+            <a:avLst/>
+          </a:prstGeom>
+          <a:noFill/>
+        </p:spPr>
+        <p:txBody>
+          <a:bodyPr wrap="square" rtlCol="0">
+            <a:spAutoFit/>
+          </a:bodyPr>
+          <a:lstStyle/>
+          <a:p>
+            <a:r>
+              <a:rPr lang="en-US" i="1" dirty="0" smtClean="0"/>
+              <a:t>i</a:t>
+            </a:r>
+            <a:r>
+              <a:rPr lang="en-US" i="1" dirty="0" smtClean="0"/>
+              <a:t>s using</a:t>
+            </a:r>
+            <a:endParaRPr lang="en-US" i="1" dirty="0"/>
+          </a:p>
+        </p:txBody>
+      </p:sp>
     </p:spTree>
   </p:cSld>
   <p:clrMapOvr>
@@ -3804,7 +4015,7 @@
         </p:nvSpPr>
         <p:spPr>
           <a:xfrm rot="18015862">
-            <a:off x="7485037" y="3911219"/>
+            <a:off x="6879705" y="3911218"/>
             <a:ext cx="1769217" cy="369332"/>
           </a:xfrm>
           <a:prstGeom prst="rect">
@@ -3834,8 +4045,8 @@
         </p:nvSpPr>
         <p:spPr>
           <a:xfrm rot="18015862">
-            <a:off x="5885145" y="3327815"/>
-            <a:ext cx="2590800" cy="369332"/>
+            <a:off x="5885145" y="3220092"/>
+            <a:ext cx="2590800" cy="584776"/>
           </a:xfrm>
           <a:prstGeom prst="rect">
             <a:avLst/>
@@ -3850,9 +4061,21 @@
           <a:p>
             <a:r>
               <a:rPr lang="en-US" dirty="0" smtClean="0"/>
-              <a:t>Collaborative Networks</a:t>
-            </a:r>
-            <a:endParaRPr lang="en-US" dirty="0"/>
+              <a:t>Collaborative Network </a:t>
+            </a:r>
+            <a:r>
+              <a:rPr lang="en-US" sz="1400" dirty="0" smtClean="0"/>
+              <a:t>(</a:t>
+            </a:r>
+            <a:r>
+              <a:rPr lang="en-US" sz="1400" dirty="0" smtClean="0"/>
+              <a:t>Virtual </a:t>
+            </a:r>
+            <a:r>
+              <a:rPr lang="en-US" sz="1400" dirty="0" smtClean="0"/>
+              <a:t>organizations)</a:t>
+            </a:r>
+            <a:endParaRPr lang="en-US" sz="1400" dirty="0"/>
           </a:p>
         </p:txBody>
       </p:sp>
@@ -3888,14 +4111,14 @@
       </p:sp>
       <p:sp>
         <p:nvSpPr>
-          <p:cNvPr id="12" name="TextBox 11"/>
+          <p:cNvPr id="13" name="TextBox 12"/>
           <p:cNvSpPr txBox="1"/>
           <p:nvPr/>
         </p:nvSpPr>
         <p:spPr>
           <a:xfrm rot="18015862">
-            <a:off x="6037544" y="4394615"/>
-            <a:ext cx="2590800" cy="369332"/>
+            <a:off x="7277266" y="4819155"/>
+            <a:ext cx="1431292" cy="369332"/>
           </a:xfrm>
           <a:prstGeom prst="rect">
             <a:avLst/>
@@ -3909,8 +4132,8 @@
           <a:lstStyle/>
           <a:p>
             <a:r>
-              <a:rPr lang="en-US" dirty="0" smtClean="0"/>
-              <a:t>Virtual organizations</a:t>
+              <a:rPr lang="en-US" dirty="0" err="1" smtClean="0"/>
+              <a:t>Coopetition</a:t>
             </a:r>
             <a:endParaRPr lang="en-US" dirty="0"/>
           </a:p>
@@ -3918,48 +4141,18 @@
       </p:sp>
       <p:sp>
         <p:nvSpPr>
-          <p:cNvPr id="13" name="TextBox 12"/>
-          <p:cNvSpPr txBox="1"/>
+          <p:cNvPr id="14" name="Rectangle 13"/>
+          <p:cNvSpPr/>
           <p:nvPr/>
         </p:nvSpPr>
         <p:spPr>
-          <a:xfrm rot="18015862">
-            <a:off x="7429667" y="2980476"/>
-            <a:ext cx="1431292" cy="369332"/>
+          <a:xfrm rot="18051165">
+            <a:off x="509057" y="4472371"/>
+            <a:ext cx="2031325" cy="369332"/>
           </a:xfrm>
           <a:prstGeom prst="rect">
             <a:avLst/>
           </a:prstGeom>
-          <a:noFill/>
-        </p:spPr>
-        <p:txBody>
-          <a:bodyPr wrap="square" rtlCol="0">
-            <a:spAutoFit/>
-          </a:bodyPr>
-          <a:lstStyle/>
-          <a:p>
-            <a:r>
-              <a:rPr lang="en-US" dirty="0" err="1" smtClean="0"/>
-              <a:t>Coopetition</a:t>
-            </a:r>
-            <a:endParaRPr lang="en-US" dirty="0"/>
-          </a:p>
-        </p:txBody>
-      </p:sp>
-      <p:sp>
-        <p:nvSpPr>
-          <p:cNvPr id="14" name="Rectangle 13"/>
-          <p:cNvSpPr/>
-          <p:nvPr/>
-        </p:nvSpPr>
-        <p:spPr>
-          <a:xfrm rot="18051165">
-            <a:off x="467179" y="4472371"/>
-            <a:ext cx="2115082" cy="369332"/>
-          </a:xfrm>
-          <a:prstGeom prst="rect">
-            <a:avLst/>
-          </a:prstGeom>
         </p:spPr>
         <p:txBody>
           <a:bodyPr wrap="none">
@@ -3968,11 +4161,11 @@
           <a:lstStyle/>
           <a:p>
             <a:r>
-              <a:rPr lang="en-US" b="1" i="1" dirty="0" smtClean="0"/>
+              <a:rPr lang="en-US" u="sng" dirty="0" smtClean="0"/>
               <a:t> </a:t>
             </a:r>
             <a:r>
-              <a:rPr lang="en-US" b="1" i="1" dirty="0" smtClean="0">
+              <a:rPr lang="en-US" u="sng" dirty="0" smtClean="0">
                 <a:solidFill>
                   <a:schemeClr val="tx2">
                     <a:lumMod val="75000"/>
@@ -3981,7 +4174,7 @@
               </a:rPr>
               <a:t>Business monarchy</a:t>
             </a:r>
-            <a:endParaRPr lang="en-US" b="1" i="1" dirty="0">
+            <a:endParaRPr lang="en-US" u="sng" dirty="0">
               <a:solidFill>
                 <a:schemeClr val="tx2">
                   <a:lumMod val="75000"/>
@@ -3999,8 +4192,8 @@
         </p:nvSpPr>
         <p:spPr>
           <a:xfrm rot="18093170">
-            <a:off x="1843330" y="2825023"/>
-            <a:ext cx="1475108" cy="369332"/>
+            <a:off x="1883968" y="2825023"/>
+            <a:ext cx="1393831" cy="369332"/>
           </a:xfrm>
           <a:prstGeom prst="rect">
             <a:avLst/>
@@ -4013,11 +4206,11 @@
           <a:lstStyle/>
           <a:p>
             <a:r>
-              <a:rPr lang="en-US" b="1" i="1" dirty="0" smtClean="0"/>
+              <a:rPr lang="en-US" u="sng" dirty="0" smtClean="0"/>
               <a:t> </a:t>
             </a:r>
             <a:r>
-              <a:rPr lang="en-US" b="1" i="1" dirty="0" smtClean="0">
+              <a:rPr lang="en-US" u="sng" dirty="0" smtClean="0">
                 <a:solidFill>
                   <a:schemeClr val="tx2">
                     <a:lumMod val="75000"/>
@@ -4026,7 +4219,7 @@
               </a:rPr>
               <a:t>IT monarchy</a:t>
             </a:r>
-            <a:endParaRPr lang="en-US" b="1" i="1" dirty="0">
+            <a:endParaRPr lang="en-US" u="sng" dirty="0">
               <a:solidFill>
                 <a:schemeClr val="tx2">
                   <a:lumMod val="75000"/>
@@ -4044,8 +4237,8 @@
         </p:nvSpPr>
         <p:spPr>
           <a:xfrm rot="18130958">
-            <a:off x="4528109" y="4578351"/>
-            <a:ext cx="2197249" cy="369332"/>
+            <a:off x="4591515" y="4578351"/>
+            <a:ext cx="2070436" cy="369332"/>
           </a:xfrm>
           <a:prstGeom prst="rect">
             <a:avLst/>
@@ -4058,11 +4251,11 @@
           <a:lstStyle/>
           <a:p>
             <a:r>
-              <a:rPr lang="en-US" b="1" i="1" dirty="0" smtClean="0"/>
+              <a:rPr lang="en-US" u="sng" dirty="0" smtClean="0"/>
               <a:t> </a:t>
             </a:r>
             <a:r>
-              <a:rPr lang="en-US" b="1" i="1" dirty="0" smtClean="0">
+              <a:rPr lang="en-US" u="sng" dirty="0" smtClean="0">
                 <a:solidFill>
                   <a:schemeClr val="tx2">
                     <a:lumMod val="75000"/>
@@ -4071,7 +4264,7 @@
               </a:rPr>
               <a:t>Feudal organization</a:t>
             </a:r>
-            <a:endParaRPr lang="en-US" b="1" i="1" dirty="0">
+            <a:endParaRPr lang="en-US" u="sng" dirty="0">
               <a:solidFill>
                 <a:schemeClr val="tx2">
                   <a:lumMod val="75000"/>
@@ -4089,8 +4282,8 @@
         </p:nvSpPr>
         <p:spPr>
           <a:xfrm rot="18114853">
-            <a:off x="3930635" y="4909734"/>
-            <a:ext cx="1232216" cy="369332"/>
+            <a:off x="3967097" y="4909734"/>
+            <a:ext cx="1159292" cy="369332"/>
           </a:xfrm>
           <a:prstGeom prst="rect">
             <a:avLst/>
@@ -4103,11 +4296,11 @@
           <a:lstStyle/>
           <a:p>
             <a:r>
-              <a:rPr lang="en-US" b="1" i="1" dirty="0" smtClean="0"/>
+              <a:rPr lang="en-US" u="sng" dirty="0" smtClean="0"/>
               <a:t> </a:t>
             </a:r>
             <a:r>
-              <a:rPr lang="en-US" b="1" i="1" dirty="0" smtClean="0">
+              <a:rPr lang="en-US" u="sng" dirty="0" smtClean="0">
                 <a:solidFill>
                   <a:schemeClr val="tx2">
                     <a:lumMod val="75000"/>
@@ -4116,7 +4309,7 @@
               </a:rPr>
               <a:t>Federal IT</a:t>
             </a:r>
-            <a:endParaRPr lang="en-US" b="1" i="1" dirty="0">
+            <a:endParaRPr lang="en-US" u="sng" dirty="0">
               <a:solidFill>
                 <a:schemeClr val="tx2">
                   <a:lumMod val="75000"/>
@@ -4134,8 +4327,8 @@
         </p:nvSpPr>
         <p:spPr>
           <a:xfrm rot="18043813">
-            <a:off x="2287369" y="4891455"/>
-            <a:ext cx="1266931" cy="369332"/>
+            <a:off x="2324344" y="4891455"/>
+            <a:ext cx="1192980" cy="369332"/>
           </a:xfrm>
           <a:prstGeom prst="rect">
             <a:avLst/>
@@ -4148,7 +4341,7 @@
           <a:lstStyle/>
           <a:p>
             <a:r>
-              <a:rPr lang="en-US" b="1" i="1" dirty="0" smtClean="0">
+              <a:rPr lang="en-US" u="sng" dirty="0" smtClean="0">
                 <a:solidFill>
                   <a:srgbClr val="17375E"/>
                 </a:solidFill>
@@ -4156,7 +4349,7 @@
               <a:t>IT </a:t>
             </a:r>
             <a:r>
-              <a:rPr lang="en-US" b="1" i="1" dirty="0" smtClean="0">
+              <a:rPr lang="en-US" u="sng" dirty="0" smtClean="0">
                 <a:solidFill>
                   <a:srgbClr val="17375E"/>
                 </a:solidFill>
@@ -4174,8 +4367,8 @@
         </p:nvSpPr>
         <p:spPr>
           <a:xfrm rot="17942027">
-            <a:off x="7204151" y="5143908"/>
-            <a:ext cx="1027532" cy="369332"/>
+            <a:off x="6595659" y="5094203"/>
+            <a:ext cx="966931" cy="369332"/>
           </a:xfrm>
           <a:prstGeom prst="rect">
             <a:avLst/>
@@ -4188,14 +4381,14 @@
           <a:lstStyle/>
           <a:p>
             <a:r>
-              <a:rPr lang="en-US" b="1" i="1" dirty="0" smtClean="0">
+              <a:rPr lang="en-US" u="sng" dirty="0" smtClean="0">
                 <a:solidFill>
                   <a:srgbClr val="17375E"/>
                 </a:solidFill>
               </a:rPr>
               <a:t>Anarchy</a:t>
             </a:r>
-            <a:endParaRPr lang="en-US" b="1" i="1" dirty="0" smtClean="0">
+            <a:endParaRPr lang="en-US" u="sng" dirty="0" smtClean="0">
               <a:solidFill>
                 <a:srgbClr val="17375E"/>
               </a:solidFill>
@@ -4212,7 +4405,7 @@
         <p:spPr>
           <a:xfrm>
             <a:off x="3791085" y="5802868"/>
-            <a:ext cx="933315" cy="369332"/>
+            <a:ext cx="1161330" cy="369332"/>
           </a:xfrm>
           <a:prstGeom prst="rect">
             <a:avLst/>
@@ -4230,7 +4423,7 @@
                   <a:srgbClr val="800000"/>
                 </a:solidFill>
               </a:rPr>
-              <a:t> Federal</a:t>
+              <a:t> Federal IT</a:t>
             </a:r>
             <a:endParaRPr lang="en-US" b="1" cap="small" dirty="0">
               <a:solidFill>
@@ -4249,7 +4442,7 @@
         <p:spPr>
           <a:xfrm>
             <a:off x="6578923" y="5791200"/>
-            <a:ext cx="1456385" cy="369332"/>
+            <a:ext cx="1684399" cy="369332"/>
           </a:xfrm>
           <a:prstGeom prst="rect">
             <a:avLst/>
@@ -4267,7 +4460,7 @@
                   <a:srgbClr val="800000"/>
                 </a:solidFill>
               </a:rPr>
-              <a:t>Decentralized</a:t>
+              <a:t>Decentralized IT</a:t>
             </a:r>
             <a:endParaRPr lang="en-US" b="1" cap="small" dirty="0">
               <a:solidFill>
@@ -4286,7 +4479,7 @@
         <p:spPr>
           <a:xfrm>
             <a:off x="885663" y="5802868"/>
-            <a:ext cx="1247937" cy="369332"/>
+            <a:ext cx="1475951" cy="369332"/>
           </a:xfrm>
           <a:prstGeom prst="rect">
             <a:avLst/>
@@ -4304,7 +4497,7 @@
                   <a:srgbClr val="800000"/>
                 </a:solidFill>
               </a:rPr>
-              <a:t>Centralized</a:t>
+              <a:t>Centralized IT</a:t>
             </a:r>
             <a:endParaRPr lang="en-US" b="1" cap="small" dirty="0">
               <a:solidFill>

</xml_diff>